<commit_message>
More mockups and moved sources to txt.
</commit_message>
<xml_diff>
--- a/docs/Mockups/Dashboard/Goals Additional.pptx
+++ b/docs/Mockups/Dashboard/Goals Additional.pptx
@@ -3163,7 +3163,12 @@
             <a:schemeClr val="bg1"/>
           </a:solidFill>
           <a:ln w="19050">
-            <a:noFill/>
+            <a:solidFill>
+              <a:schemeClr val="tx1">
+                <a:lumMod val="50000"/>
+                <a:lumOff val="50000"/>
+              </a:schemeClr>
+            </a:solidFill>
           </a:ln>
           <a:effectLst>
             <a:outerShdw blurRad="330200" sx="103000" sy="103000" algn="ctr" rotWithShape="0">
@@ -3202,6 +3207,1078 @@
           </a:p>
         </p:txBody>
       </p:sp>
+      <p:sp>
+        <p:nvSpPr>
+          <p:cNvPr id="26" name="Rectangle 25"/>
+          <p:cNvSpPr/>
+          <p:nvPr/>
+        </p:nvSpPr>
+        <p:spPr>
+          <a:xfrm>
+            <a:off x="3785746" y="838200"/>
+            <a:ext cx="1496307" cy="584775"/>
+          </a:xfrm>
+          <a:prstGeom prst="rect">
+            <a:avLst/>
+          </a:prstGeom>
+        </p:spPr>
+        <p:txBody>
+          <a:bodyPr wrap="none">
+            <a:spAutoFit/>
+          </a:bodyPr>
+          <a:lstStyle/>
+          <a:p>
+            <a:r>
+              <a:rPr lang="en-US" sz="3200" dirty="0">
+                <a:solidFill>
+                  <a:schemeClr val="tx1">
+                    <a:lumMod val="50000"/>
+                    <a:lumOff val="50000"/>
+                  </a:schemeClr>
+                </a:solidFill>
+                <a:latin typeface="Calibri Light" panose="020F0302020204030204" pitchFamily="34" charset="0"/>
+              </a:rPr>
+              <a:t>Walking</a:t>
+            </a:r>
+            <a:endParaRPr lang="en-US" sz="3200" dirty="0">
+              <a:solidFill>
+                <a:schemeClr val="tx1">
+                  <a:lumMod val="50000"/>
+                  <a:lumOff val="50000"/>
+                </a:schemeClr>
+              </a:solidFill>
+              <a:latin typeface="Calibri Light" panose="020F0302020204030204" pitchFamily="34" charset="0"/>
+            </a:endParaRPr>
+          </a:p>
+        </p:txBody>
+      </p:sp>
+      <p:sp>
+        <p:nvSpPr>
+          <p:cNvPr id="44" name="TextBox 43"/>
+          <p:cNvSpPr txBox="1"/>
+          <p:nvPr/>
+        </p:nvSpPr>
+        <p:spPr>
+          <a:xfrm>
+            <a:off x="2581275" y="1596445"/>
+            <a:ext cx="3481386" cy="381000"/>
+          </a:xfrm>
+          <a:prstGeom prst="rect">
+            <a:avLst/>
+          </a:prstGeom>
+          <a:noFill/>
+        </p:spPr>
+        <p:txBody>
+          <a:bodyPr wrap="square" rtlCol="0">
+            <a:spAutoFit/>
+          </a:bodyPr>
+          <a:lstStyle/>
+          <a:p>
+            <a:r>
+              <a:rPr lang="en-US" dirty="0" smtClean="0">
+                <a:solidFill>
+                  <a:schemeClr val="tx1">
+                    <a:lumMod val="50000"/>
+                    <a:lumOff val="50000"/>
+                  </a:schemeClr>
+                </a:solidFill>
+                <a:latin typeface="Calibri Light" panose="020F0302020204030204" pitchFamily="34" charset="0"/>
+              </a:rPr>
+              <a:t>I will walk for 30 minutes every day.</a:t>
+            </a:r>
+            <a:endParaRPr lang="en-US" dirty="0">
+              <a:solidFill>
+                <a:schemeClr val="tx1">
+                  <a:lumMod val="50000"/>
+                  <a:lumOff val="50000"/>
+                </a:schemeClr>
+              </a:solidFill>
+              <a:latin typeface="Calibri Light" panose="020F0302020204030204" pitchFamily="34" charset="0"/>
+            </a:endParaRPr>
+          </a:p>
+        </p:txBody>
+      </p:sp>
+      <p:sp>
+        <p:nvSpPr>
+          <p:cNvPr id="45" name="Rectangle 44"/>
+          <p:cNvSpPr/>
+          <p:nvPr/>
+        </p:nvSpPr>
+        <p:spPr>
+          <a:xfrm>
+            <a:off x="2581275" y="1996494"/>
+            <a:ext cx="4624386" cy="114302"/>
+          </a:xfrm>
+          <a:prstGeom prst="rect">
+            <a:avLst/>
+          </a:prstGeom>
+          <a:solidFill>
+            <a:srgbClr val="00B050"/>
+          </a:solidFill>
+          <a:ln w="3175">
+            <a:solidFill>
+              <a:schemeClr val="tx1">
+                <a:lumMod val="50000"/>
+                <a:lumOff val="50000"/>
+              </a:schemeClr>
+            </a:solidFill>
+          </a:ln>
+        </p:spPr>
+        <p:style>
+          <a:lnRef idx="2">
+            <a:schemeClr val="accent1">
+              <a:shade val="50000"/>
+            </a:schemeClr>
+          </a:lnRef>
+          <a:fillRef idx="1">
+            <a:schemeClr val="accent1"/>
+          </a:fillRef>
+          <a:effectRef idx="0">
+            <a:schemeClr val="accent1"/>
+          </a:effectRef>
+          <a:fontRef idx="minor">
+            <a:schemeClr val="lt1"/>
+          </a:fontRef>
+        </p:style>
+        <p:txBody>
+          <a:bodyPr rtlCol="0" anchor="ctr"/>
+          <a:lstStyle/>
+          <a:p>
+            <a:pPr algn="ctr"/>
+            <a:endParaRPr lang="en-US" dirty="0" smtClean="0">
+              <a:solidFill>
+                <a:srgbClr val="028835"/>
+              </a:solidFill>
+            </a:endParaRPr>
+          </a:p>
+        </p:txBody>
+      </p:sp>
+      <p:sp>
+        <p:nvSpPr>
+          <p:cNvPr id="46" name="TextBox 45"/>
+          <p:cNvSpPr txBox="1"/>
+          <p:nvPr/>
+        </p:nvSpPr>
+        <p:spPr>
+          <a:xfrm>
+            <a:off x="2581275" y="2495552"/>
+            <a:ext cx="3481386" cy="381000"/>
+          </a:xfrm>
+          <a:prstGeom prst="rect">
+            <a:avLst/>
+          </a:prstGeom>
+          <a:noFill/>
+        </p:spPr>
+        <p:txBody>
+          <a:bodyPr wrap="square" rtlCol="0">
+            <a:spAutoFit/>
+          </a:bodyPr>
+          <a:lstStyle/>
+          <a:p>
+            <a:r>
+              <a:rPr lang="en-US" dirty="0" smtClean="0">
+                <a:solidFill>
+                  <a:schemeClr val="tx1">
+                    <a:lumMod val="50000"/>
+                    <a:lumOff val="50000"/>
+                  </a:schemeClr>
+                </a:solidFill>
+                <a:latin typeface="Calibri Light" panose="020F0302020204030204" pitchFamily="34" charset="0"/>
+              </a:rPr>
+              <a:t>I will run </a:t>
+            </a:r>
+            <a:r>
+              <a:rPr lang="en-US" dirty="0" smtClean="0">
+                <a:solidFill>
+                  <a:schemeClr val="tx1">
+                    <a:lumMod val="50000"/>
+                    <a:lumOff val="50000"/>
+                  </a:schemeClr>
+                </a:solidFill>
+                <a:latin typeface="Calibri Light" panose="020F0302020204030204" pitchFamily="34" charset="0"/>
+              </a:rPr>
+              <a:t>for 2 </a:t>
+            </a:r>
+            <a:r>
+              <a:rPr lang="en-US" dirty="0" smtClean="0">
+                <a:solidFill>
+                  <a:schemeClr val="tx1">
+                    <a:lumMod val="50000"/>
+                    <a:lumOff val="50000"/>
+                  </a:schemeClr>
+                </a:solidFill>
+                <a:latin typeface="Calibri Light" panose="020F0302020204030204" pitchFamily="34" charset="0"/>
+              </a:rPr>
+              <a:t>miles every week.</a:t>
+            </a:r>
+            <a:endParaRPr lang="en-US" dirty="0">
+              <a:solidFill>
+                <a:schemeClr val="tx1">
+                  <a:lumMod val="50000"/>
+                  <a:lumOff val="50000"/>
+                </a:schemeClr>
+              </a:solidFill>
+              <a:latin typeface="Calibri Light" panose="020F0302020204030204" pitchFamily="34" charset="0"/>
+            </a:endParaRPr>
+          </a:p>
+        </p:txBody>
+      </p:sp>
+      <p:sp>
+        <p:nvSpPr>
+          <p:cNvPr id="47" name="Rectangle 46"/>
+          <p:cNvSpPr/>
+          <p:nvPr/>
+        </p:nvSpPr>
+        <p:spPr>
+          <a:xfrm>
+            <a:off x="2581275" y="2871934"/>
+            <a:ext cx="4572000" cy="114302"/>
+          </a:xfrm>
+          <a:prstGeom prst="rect">
+            <a:avLst/>
+          </a:prstGeom>
+          <a:solidFill>
+            <a:srgbClr val="00B050"/>
+          </a:solidFill>
+          <a:ln w="3175">
+            <a:solidFill>
+              <a:schemeClr val="tx1">
+                <a:lumMod val="50000"/>
+                <a:lumOff val="50000"/>
+              </a:schemeClr>
+            </a:solidFill>
+          </a:ln>
+        </p:spPr>
+        <p:style>
+          <a:lnRef idx="2">
+            <a:schemeClr val="accent1">
+              <a:shade val="50000"/>
+            </a:schemeClr>
+          </a:lnRef>
+          <a:fillRef idx="1">
+            <a:schemeClr val="accent1"/>
+          </a:fillRef>
+          <a:effectRef idx="0">
+            <a:schemeClr val="accent1"/>
+          </a:effectRef>
+          <a:fontRef idx="minor">
+            <a:schemeClr val="lt1"/>
+          </a:fontRef>
+        </p:style>
+        <p:txBody>
+          <a:bodyPr rtlCol="0" anchor="ctr"/>
+          <a:lstStyle/>
+          <a:p>
+            <a:pPr algn="ctr"/>
+            <a:endParaRPr lang="en-US" dirty="0" smtClean="0">
+              <a:solidFill>
+                <a:srgbClr val="028835"/>
+              </a:solidFill>
+            </a:endParaRPr>
+          </a:p>
+        </p:txBody>
+      </p:sp>
+      <p:sp>
+        <p:nvSpPr>
+          <p:cNvPr id="48" name="Rectangle 47"/>
+          <p:cNvSpPr/>
+          <p:nvPr/>
+        </p:nvSpPr>
+        <p:spPr>
+          <a:xfrm>
+            <a:off x="4919661" y="2876552"/>
+            <a:ext cx="2286000" cy="114302"/>
+          </a:xfrm>
+          <a:prstGeom prst="rect">
+            <a:avLst/>
+          </a:prstGeom>
+          <a:solidFill>
+            <a:schemeClr val="bg1"/>
+          </a:solidFill>
+          <a:ln w="3175">
+            <a:solidFill>
+              <a:schemeClr val="tx1">
+                <a:lumMod val="50000"/>
+                <a:lumOff val="50000"/>
+              </a:schemeClr>
+            </a:solidFill>
+          </a:ln>
+        </p:spPr>
+        <p:style>
+          <a:lnRef idx="2">
+            <a:schemeClr val="accent1">
+              <a:shade val="50000"/>
+            </a:schemeClr>
+          </a:lnRef>
+          <a:fillRef idx="1">
+            <a:schemeClr val="accent1"/>
+          </a:fillRef>
+          <a:effectRef idx="0">
+            <a:schemeClr val="accent1"/>
+          </a:effectRef>
+          <a:fontRef idx="minor">
+            <a:schemeClr val="lt1"/>
+          </a:fontRef>
+        </p:style>
+        <p:txBody>
+          <a:bodyPr rtlCol="0" anchor="ctr"/>
+          <a:lstStyle/>
+          <a:p>
+            <a:pPr algn="ctr"/>
+            <a:endParaRPr lang="en-US" dirty="0" smtClean="0">
+              <a:solidFill>
+                <a:schemeClr val="tx1"/>
+              </a:solidFill>
+            </a:endParaRPr>
+          </a:p>
+        </p:txBody>
+      </p:sp>
+      <p:sp>
+        <p:nvSpPr>
+          <p:cNvPr id="28" name="Oval 27"/>
+          <p:cNvSpPr/>
+          <p:nvPr/>
+        </p:nvSpPr>
+        <p:spPr>
+          <a:xfrm>
+            <a:off x="1676400" y="1729794"/>
+            <a:ext cx="304800" cy="266700"/>
+          </a:xfrm>
+          <a:prstGeom prst="ellipse">
+            <a:avLst/>
+          </a:prstGeom>
+          <a:solidFill>
+            <a:schemeClr val="bg1"/>
+          </a:solidFill>
+          <a:ln w="3175">
+            <a:solidFill>
+              <a:schemeClr val="tx1">
+                <a:lumMod val="75000"/>
+                <a:lumOff val="25000"/>
+              </a:schemeClr>
+            </a:solidFill>
+          </a:ln>
+        </p:spPr>
+        <p:style>
+          <a:lnRef idx="2">
+            <a:schemeClr val="accent1">
+              <a:shade val="50000"/>
+            </a:schemeClr>
+          </a:lnRef>
+          <a:fillRef idx="1">
+            <a:schemeClr val="accent1"/>
+          </a:fillRef>
+          <a:effectRef idx="0">
+            <a:schemeClr val="accent1"/>
+          </a:effectRef>
+          <a:fontRef idx="minor">
+            <a:schemeClr val="lt1"/>
+          </a:fontRef>
+        </p:style>
+        <p:txBody>
+          <a:bodyPr rtlCol="0" anchor="ctr"/>
+          <a:lstStyle/>
+          <a:p>
+            <a:pPr algn="ctr"/>
+            <a:endParaRPr lang="en-US" dirty="0" smtClean="0">
+              <a:solidFill>
+                <a:schemeClr val="tx1"/>
+              </a:solidFill>
+            </a:endParaRPr>
+          </a:p>
+        </p:txBody>
+      </p:sp>
+      <p:sp>
+        <p:nvSpPr>
+          <p:cNvPr id="49" name="Oval 48"/>
+          <p:cNvSpPr/>
+          <p:nvPr/>
+        </p:nvSpPr>
+        <p:spPr>
+          <a:xfrm>
+            <a:off x="1676400" y="2686052"/>
+            <a:ext cx="304800" cy="266700"/>
+          </a:xfrm>
+          <a:prstGeom prst="ellipse">
+            <a:avLst/>
+          </a:prstGeom>
+          <a:gradFill flip="none" rotWithShape="1">
+            <a:gsLst>
+              <a:gs pos="0">
+                <a:schemeClr val="tx1">
+                  <a:lumMod val="22000"/>
+                  <a:lumOff val="78000"/>
+                </a:schemeClr>
+              </a:gs>
+              <a:gs pos="70000">
+                <a:schemeClr val="tx1">
+                  <a:lumMod val="50000"/>
+                  <a:lumOff val="50000"/>
+                </a:schemeClr>
+              </a:gs>
+              <a:gs pos="100000">
+                <a:schemeClr val="tx1">
+                  <a:lumMod val="50000"/>
+                  <a:lumOff val="50000"/>
+                </a:schemeClr>
+              </a:gs>
+            </a:gsLst>
+            <a:lin ang="10800000" scaled="1"/>
+            <a:tileRect/>
+          </a:gradFill>
+          <a:ln w="3175">
+            <a:solidFill>
+              <a:schemeClr val="tx1">
+                <a:lumMod val="75000"/>
+                <a:lumOff val="25000"/>
+              </a:schemeClr>
+            </a:solidFill>
+          </a:ln>
+        </p:spPr>
+        <p:style>
+          <a:lnRef idx="2">
+            <a:schemeClr val="accent1">
+              <a:shade val="50000"/>
+            </a:schemeClr>
+          </a:lnRef>
+          <a:fillRef idx="1">
+            <a:schemeClr val="accent1"/>
+          </a:fillRef>
+          <a:effectRef idx="0">
+            <a:schemeClr val="accent1"/>
+          </a:effectRef>
+          <a:fontRef idx="minor">
+            <a:schemeClr val="lt1"/>
+          </a:fontRef>
+        </p:style>
+        <p:txBody>
+          <a:bodyPr rtlCol="0" anchor="ctr"/>
+          <a:lstStyle/>
+          <a:p>
+            <a:pPr algn="ctr"/>
+            <a:endParaRPr lang="en-US" dirty="0" smtClean="0">
+              <a:solidFill>
+                <a:schemeClr val="tx1"/>
+              </a:solidFill>
+            </a:endParaRPr>
+          </a:p>
+        </p:txBody>
+      </p:sp>
+      <p:sp>
+        <p:nvSpPr>
+          <p:cNvPr id="30" name="TextBox 29"/>
+          <p:cNvSpPr txBox="1"/>
+          <p:nvPr/>
+        </p:nvSpPr>
+        <p:spPr>
+          <a:xfrm>
+            <a:off x="2000246" y="3600629"/>
+            <a:ext cx="619125" cy="369332"/>
+          </a:xfrm>
+          <a:prstGeom prst="rect">
+            <a:avLst/>
+          </a:prstGeom>
+          <a:noFill/>
+        </p:spPr>
+        <p:txBody>
+          <a:bodyPr wrap="square" rtlCol="0">
+            <a:spAutoFit/>
+          </a:bodyPr>
+          <a:lstStyle/>
+          <a:p>
+            <a:r>
+              <a:rPr lang="en-US" dirty="0" smtClean="0">
+                <a:solidFill>
+                  <a:schemeClr val="tx1">
+                    <a:lumMod val="50000"/>
+                    <a:lumOff val="50000"/>
+                  </a:schemeClr>
+                </a:solidFill>
+                <a:latin typeface="Calibri Light" panose="020F0302020204030204" pitchFamily="34" charset="0"/>
+              </a:rPr>
+              <a:t>I will</a:t>
+            </a:r>
+            <a:endParaRPr lang="en-US" dirty="0">
+              <a:solidFill>
+                <a:schemeClr val="tx1">
+                  <a:lumMod val="50000"/>
+                  <a:lumOff val="50000"/>
+                </a:schemeClr>
+              </a:solidFill>
+              <a:latin typeface="Calibri Light" panose="020F0302020204030204" pitchFamily="34" charset="0"/>
+            </a:endParaRPr>
+          </a:p>
+        </p:txBody>
+      </p:sp>
+      <p:sp>
+        <p:nvSpPr>
+          <p:cNvPr id="51" name="TextBox 50"/>
+          <p:cNvSpPr txBox="1"/>
+          <p:nvPr/>
+        </p:nvSpPr>
+        <p:spPr>
+          <a:xfrm>
+            <a:off x="2152647" y="4128969"/>
+            <a:ext cx="542925" cy="369332"/>
+          </a:xfrm>
+          <a:prstGeom prst="rect">
+            <a:avLst/>
+          </a:prstGeom>
+          <a:noFill/>
+        </p:spPr>
+        <p:txBody>
+          <a:bodyPr wrap="square" rtlCol="0">
+            <a:spAutoFit/>
+          </a:bodyPr>
+          <a:lstStyle/>
+          <a:p>
+            <a:r>
+              <a:rPr lang="en-US" dirty="0" smtClean="0">
+                <a:solidFill>
+                  <a:schemeClr val="tx1">
+                    <a:lumMod val="50000"/>
+                    <a:lumOff val="50000"/>
+                  </a:schemeClr>
+                </a:solidFill>
+                <a:latin typeface="Calibri Light" panose="020F0302020204030204" pitchFamily="34" charset="0"/>
+              </a:rPr>
+              <a:t>for</a:t>
+            </a:r>
+            <a:endParaRPr lang="en-US" dirty="0">
+              <a:solidFill>
+                <a:schemeClr val="tx1">
+                  <a:lumMod val="50000"/>
+                  <a:lumOff val="50000"/>
+                </a:schemeClr>
+              </a:solidFill>
+              <a:latin typeface="Calibri Light" panose="020F0302020204030204" pitchFamily="34" charset="0"/>
+            </a:endParaRPr>
+          </a:p>
+        </p:txBody>
+      </p:sp>
+      <p:sp>
+        <p:nvSpPr>
+          <p:cNvPr id="52" name="TextBox 51"/>
+          <p:cNvSpPr txBox="1"/>
+          <p:nvPr/>
+        </p:nvSpPr>
+        <p:spPr>
+          <a:xfrm>
+            <a:off x="1895471" y="4656714"/>
+            <a:ext cx="723900" cy="369332"/>
+          </a:xfrm>
+          <a:prstGeom prst="rect">
+            <a:avLst/>
+          </a:prstGeom>
+          <a:noFill/>
+        </p:spPr>
+        <p:txBody>
+          <a:bodyPr wrap="square" rtlCol="0">
+            <a:spAutoFit/>
+          </a:bodyPr>
+          <a:lstStyle/>
+          <a:p>
+            <a:r>
+              <a:rPr lang="en-US" dirty="0" smtClean="0">
+                <a:solidFill>
+                  <a:schemeClr val="tx1">
+                    <a:lumMod val="50000"/>
+                    <a:lumOff val="50000"/>
+                  </a:schemeClr>
+                </a:solidFill>
+                <a:latin typeface="Calibri Light" panose="020F0302020204030204" pitchFamily="34" charset="0"/>
+              </a:rPr>
+              <a:t>every</a:t>
+            </a:r>
+            <a:endParaRPr lang="en-US" dirty="0">
+              <a:solidFill>
+                <a:schemeClr val="tx1">
+                  <a:lumMod val="50000"/>
+                  <a:lumOff val="50000"/>
+                </a:schemeClr>
+              </a:solidFill>
+              <a:latin typeface="Calibri Light" panose="020F0302020204030204" pitchFamily="34" charset="0"/>
+            </a:endParaRPr>
+          </a:p>
+        </p:txBody>
+      </p:sp>
+      <p:sp>
+        <p:nvSpPr>
+          <p:cNvPr id="31" name="Rounded Rectangle 30"/>
+          <p:cNvSpPr/>
+          <p:nvPr/>
+        </p:nvSpPr>
+        <p:spPr>
+          <a:xfrm>
+            <a:off x="2695572" y="3622596"/>
+            <a:ext cx="3800475" cy="325398"/>
+          </a:xfrm>
+          <a:prstGeom prst="roundRect">
+            <a:avLst/>
+          </a:prstGeom>
+          <a:solidFill>
+            <a:schemeClr val="bg1"/>
+          </a:solidFill>
+          <a:ln w="3175">
+            <a:solidFill>
+              <a:schemeClr val="tx1">
+                <a:lumMod val="75000"/>
+                <a:lumOff val="25000"/>
+              </a:schemeClr>
+            </a:solidFill>
+          </a:ln>
+        </p:spPr>
+        <p:style>
+          <a:lnRef idx="2">
+            <a:schemeClr val="accent1">
+              <a:shade val="50000"/>
+            </a:schemeClr>
+          </a:lnRef>
+          <a:fillRef idx="1">
+            <a:schemeClr val="accent1"/>
+          </a:fillRef>
+          <a:effectRef idx="0">
+            <a:schemeClr val="accent1"/>
+          </a:effectRef>
+          <a:fontRef idx="minor">
+            <a:schemeClr val="lt1"/>
+          </a:fontRef>
+        </p:style>
+        <p:txBody>
+          <a:bodyPr rtlCol="0" anchor="ctr"/>
+          <a:lstStyle/>
+          <a:p>
+            <a:r>
+              <a:rPr lang="en-US" dirty="0">
+                <a:solidFill>
+                  <a:schemeClr val="tx1">
+                    <a:lumMod val="50000"/>
+                    <a:lumOff val="50000"/>
+                  </a:schemeClr>
+                </a:solidFill>
+                <a:latin typeface="Calibri Light" panose="020F0302020204030204" pitchFamily="34" charset="0"/>
+              </a:rPr>
+              <a:t>d</a:t>
+            </a:r>
+            <a:r>
+              <a:rPr lang="en-US" dirty="0" smtClean="0">
+                <a:solidFill>
+                  <a:schemeClr val="tx1">
+                    <a:lumMod val="50000"/>
+                    <a:lumOff val="50000"/>
+                  </a:schemeClr>
+                </a:solidFill>
+                <a:latin typeface="Calibri Light" panose="020F0302020204030204" pitchFamily="34" charset="0"/>
+              </a:rPr>
+              <a:t>o this exercise</a:t>
+            </a:r>
+            <a:endParaRPr lang="en-US" dirty="0" smtClean="0">
+              <a:solidFill>
+                <a:schemeClr val="tx1">
+                  <a:lumMod val="50000"/>
+                  <a:lumOff val="50000"/>
+                </a:schemeClr>
+              </a:solidFill>
+              <a:latin typeface="Calibri Light" panose="020F0302020204030204" pitchFamily="34" charset="0"/>
+            </a:endParaRPr>
+          </a:p>
+        </p:txBody>
+      </p:sp>
+      <p:sp>
+        <p:nvSpPr>
+          <p:cNvPr id="55" name="Rounded Rectangle 54"/>
+          <p:cNvSpPr/>
+          <p:nvPr/>
+        </p:nvSpPr>
+        <p:spPr>
+          <a:xfrm>
+            <a:off x="2695572" y="4128969"/>
+            <a:ext cx="3800475" cy="325398"/>
+          </a:xfrm>
+          <a:prstGeom prst="roundRect">
+            <a:avLst/>
+          </a:prstGeom>
+          <a:solidFill>
+            <a:schemeClr val="bg1"/>
+          </a:solidFill>
+          <a:ln w="3175">
+            <a:solidFill>
+              <a:schemeClr val="tx1">
+                <a:lumMod val="75000"/>
+                <a:lumOff val="25000"/>
+              </a:schemeClr>
+            </a:solidFill>
+          </a:ln>
+        </p:spPr>
+        <p:style>
+          <a:lnRef idx="2">
+            <a:schemeClr val="accent1">
+              <a:shade val="50000"/>
+            </a:schemeClr>
+          </a:lnRef>
+          <a:fillRef idx="1">
+            <a:schemeClr val="accent1"/>
+          </a:fillRef>
+          <a:effectRef idx="0">
+            <a:schemeClr val="accent1"/>
+          </a:effectRef>
+          <a:fontRef idx="minor">
+            <a:schemeClr val="lt1"/>
+          </a:fontRef>
+        </p:style>
+        <p:txBody>
+          <a:bodyPr rtlCol="0" anchor="ctr"/>
+          <a:lstStyle/>
+          <a:p>
+            <a:r>
+              <a:rPr lang="en-US" dirty="0" smtClean="0">
+                <a:solidFill>
+                  <a:schemeClr val="tx1">
+                    <a:lumMod val="50000"/>
+                    <a:lumOff val="50000"/>
+                  </a:schemeClr>
+                </a:solidFill>
+                <a:latin typeface="Calibri Light" panose="020F0302020204030204" pitchFamily="34" charset="0"/>
+              </a:rPr>
+              <a:t>this much</a:t>
+            </a:r>
+            <a:endParaRPr lang="en-US" dirty="0" smtClean="0">
+              <a:solidFill>
+                <a:schemeClr val="tx1">
+                  <a:lumMod val="50000"/>
+                  <a:lumOff val="50000"/>
+                </a:schemeClr>
+              </a:solidFill>
+              <a:latin typeface="Calibri Light" panose="020F0302020204030204" pitchFamily="34" charset="0"/>
+            </a:endParaRPr>
+          </a:p>
+        </p:txBody>
+      </p:sp>
+      <p:sp>
+        <p:nvSpPr>
+          <p:cNvPr id="56" name="Rounded Rectangle 55"/>
+          <p:cNvSpPr/>
+          <p:nvPr/>
+        </p:nvSpPr>
+        <p:spPr>
+          <a:xfrm>
+            <a:off x="2695571" y="4678681"/>
+            <a:ext cx="3800475" cy="325398"/>
+          </a:xfrm>
+          <a:prstGeom prst="roundRect">
+            <a:avLst/>
+          </a:prstGeom>
+          <a:solidFill>
+            <a:schemeClr val="bg1"/>
+          </a:solidFill>
+          <a:ln w="3175">
+            <a:solidFill>
+              <a:schemeClr val="tx1">
+                <a:lumMod val="75000"/>
+                <a:lumOff val="25000"/>
+              </a:schemeClr>
+            </a:solidFill>
+          </a:ln>
+        </p:spPr>
+        <p:style>
+          <a:lnRef idx="2">
+            <a:schemeClr val="accent1">
+              <a:shade val="50000"/>
+            </a:schemeClr>
+          </a:lnRef>
+          <a:fillRef idx="1">
+            <a:schemeClr val="accent1"/>
+          </a:fillRef>
+          <a:effectRef idx="0">
+            <a:schemeClr val="accent1"/>
+          </a:effectRef>
+          <a:fontRef idx="minor">
+            <a:schemeClr val="lt1"/>
+          </a:fontRef>
+        </p:style>
+        <p:txBody>
+          <a:bodyPr rtlCol="0" anchor="ctr"/>
+          <a:lstStyle/>
+          <a:p>
+            <a:r>
+              <a:rPr lang="en-US" dirty="0" smtClean="0">
+                <a:solidFill>
+                  <a:schemeClr val="tx1">
+                    <a:lumMod val="50000"/>
+                    <a:lumOff val="50000"/>
+                  </a:schemeClr>
+                </a:solidFill>
+                <a:latin typeface="Calibri Light" panose="020F0302020204030204" pitchFamily="34" charset="0"/>
+              </a:rPr>
+              <a:t>this amount of time</a:t>
+            </a:r>
+            <a:endParaRPr lang="en-US" dirty="0" smtClean="0">
+              <a:solidFill>
+                <a:schemeClr val="tx1">
+                  <a:lumMod val="50000"/>
+                  <a:lumOff val="50000"/>
+                </a:schemeClr>
+              </a:solidFill>
+              <a:latin typeface="Calibri Light" panose="020F0302020204030204" pitchFamily="34" charset="0"/>
+            </a:endParaRPr>
+          </a:p>
+        </p:txBody>
+      </p:sp>
+      <p:sp>
+        <p:nvSpPr>
+          <p:cNvPr id="57" name="TextBox 56"/>
+          <p:cNvSpPr txBox="1"/>
+          <p:nvPr/>
+        </p:nvSpPr>
+        <p:spPr>
+          <a:xfrm>
+            <a:off x="6496047" y="4656714"/>
+            <a:ext cx="361950" cy="369332"/>
+          </a:xfrm>
+          <a:prstGeom prst="rect">
+            <a:avLst/>
+          </a:prstGeom>
+          <a:noFill/>
+        </p:spPr>
+        <p:txBody>
+          <a:bodyPr wrap="square" rtlCol="0">
+            <a:spAutoFit/>
+          </a:bodyPr>
+          <a:lstStyle/>
+          <a:p>
+            <a:r>
+              <a:rPr lang="en-US" dirty="0" smtClean="0">
+                <a:solidFill>
+                  <a:schemeClr val="tx1">
+                    <a:lumMod val="50000"/>
+                    <a:lumOff val="50000"/>
+                  </a:schemeClr>
+                </a:solidFill>
+                <a:latin typeface="Calibri Light" panose="020F0302020204030204" pitchFamily="34" charset="0"/>
+              </a:rPr>
+              <a:t>.</a:t>
+            </a:r>
+            <a:endParaRPr lang="en-US" dirty="0">
+              <a:solidFill>
+                <a:schemeClr val="tx1">
+                  <a:lumMod val="50000"/>
+                  <a:lumOff val="50000"/>
+                </a:schemeClr>
+              </a:solidFill>
+              <a:latin typeface="Calibri Light" panose="020F0302020204030204" pitchFamily="34" charset="0"/>
+            </a:endParaRPr>
+          </a:p>
+        </p:txBody>
+      </p:sp>
+      <p:sp>
+        <p:nvSpPr>
+          <p:cNvPr id="32" name="Flowchart: Process 31"/>
+          <p:cNvSpPr/>
+          <p:nvPr/>
+        </p:nvSpPr>
+        <p:spPr>
+          <a:xfrm>
+            <a:off x="2695572" y="5324475"/>
+            <a:ext cx="3800474" cy="304800"/>
+          </a:xfrm>
+          <a:prstGeom prst="flowChartProcess">
+            <a:avLst/>
+          </a:prstGeom>
+          <a:solidFill>
+            <a:schemeClr val="bg1">
+              <a:lumMod val="95000"/>
+            </a:schemeClr>
+          </a:solidFill>
+          <a:ln w="3175">
+            <a:solidFill>
+              <a:schemeClr val="tx1">
+                <a:lumMod val="75000"/>
+                <a:lumOff val="25000"/>
+              </a:schemeClr>
+            </a:solidFill>
+          </a:ln>
+        </p:spPr>
+        <p:style>
+          <a:lnRef idx="2">
+            <a:schemeClr val="accent1">
+              <a:shade val="50000"/>
+            </a:schemeClr>
+          </a:lnRef>
+          <a:fillRef idx="1">
+            <a:schemeClr val="accent1"/>
+          </a:fillRef>
+          <a:effectRef idx="0">
+            <a:schemeClr val="accent1"/>
+          </a:effectRef>
+          <a:fontRef idx="minor">
+            <a:schemeClr val="lt1"/>
+          </a:fontRef>
+        </p:style>
+        <p:txBody>
+          <a:bodyPr rtlCol="0" anchor="ctr"/>
+          <a:lstStyle/>
+          <a:p>
+            <a:pPr algn="ctr"/>
+            <a:r>
+              <a:rPr lang="en-US" dirty="0" smtClean="0">
+                <a:solidFill>
+                  <a:schemeClr val="tx1">
+                    <a:lumMod val="75000"/>
+                    <a:lumOff val="25000"/>
+                  </a:schemeClr>
+                </a:solidFill>
+                <a:latin typeface="Calibri Light" panose="020F0302020204030204" pitchFamily="34" charset="0"/>
+              </a:rPr>
+              <a:t>Add Goal</a:t>
+            </a:r>
+            <a:endParaRPr lang="en-US" dirty="0" smtClean="0">
+              <a:solidFill>
+                <a:schemeClr val="tx1">
+                  <a:lumMod val="75000"/>
+                  <a:lumOff val="25000"/>
+                </a:schemeClr>
+              </a:solidFill>
+              <a:latin typeface="Calibri Light" panose="020F0302020204030204" pitchFamily="34" charset="0"/>
+            </a:endParaRPr>
+          </a:p>
+        </p:txBody>
+      </p:sp>
+      <p:sp>
+        <p:nvSpPr>
+          <p:cNvPr id="37" name="Oval 36"/>
+          <p:cNvSpPr/>
+          <p:nvPr/>
+        </p:nvSpPr>
+        <p:spPr>
+          <a:xfrm>
+            <a:off x="7372354" y="853350"/>
+            <a:ext cx="457200" cy="442050"/>
+          </a:xfrm>
+          <a:prstGeom prst="ellipse">
+            <a:avLst/>
+          </a:prstGeom>
+          <a:solidFill>
+            <a:schemeClr val="bg1"/>
+          </a:solidFill>
+          <a:ln w="12700">
+            <a:solidFill>
+              <a:schemeClr val="tx1">
+                <a:lumMod val="50000"/>
+                <a:lumOff val="50000"/>
+              </a:schemeClr>
+            </a:solidFill>
+          </a:ln>
+        </p:spPr>
+        <p:style>
+          <a:lnRef idx="2">
+            <a:schemeClr val="accent1">
+              <a:shade val="50000"/>
+            </a:schemeClr>
+          </a:lnRef>
+          <a:fillRef idx="1">
+            <a:schemeClr val="accent1"/>
+          </a:fillRef>
+          <a:effectRef idx="0">
+            <a:schemeClr val="accent1"/>
+          </a:effectRef>
+          <a:fontRef idx="minor">
+            <a:schemeClr val="lt1"/>
+          </a:fontRef>
+        </p:style>
+        <p:txBody>
+          <a:bodyPr rtlCol="0" anchor="ctr"/>
+          <a:lstStyle/>
+          <a:p>
+            <a:pPr algn="ctr"/>
+            <a:endParaRPr lang="en-US" dirty="0" smtClean="0">
+              <a:solidFill>
+                <a:schemeClr val="tx1">
+                  <a:lumMod val="50000"/>
+                  <a:lumOff val="50000"/>
+                </a:schemeClr>
+              </a:solidFill>
+            </a:endParaRPr>
+          </a:p>
+        </p:txBody>
+      </p:sp>
+      <p:cxnSp>
+        <p:nvCxnSpPr>
+          <p:cNvPr id="41" name="Straight Connector 40"/>
+          <p:cNvCxnSpPr>
+            <a:stCxn id="37" idx="0"/>
+          </p:cNvCxnSpPr>
+          <p:nvPr/>
+        </p:nvCxnSpPr>
+        <p:spPr>
+          <a:xfrm>
+            <a:off x="7600954" y="853350"/>
+            <a:ext cx="0" cy="221025"/>
+          </a:xfrm>
+          <a:prstGeom prst="line">
+            <a:avLst/>
+          </a:prstGeom>
+          <a:ln w="12700">
+            <a:solidFill>
+              <a:schemeClr val="tx1">
+                <a:lumMod val="50000"/>
+                <a:lumOff val="50000"/>
+              </a:schemeClr>
+            </a:solidFill>
+          </a:ln>
+        </p:spPr>
+        <p:style>
+          <a:lnRef idx="1">
+            <a:schemeClr val="accent1"/>
+          </a:lnRef>
+          <a:fillRef idx="0">
+            <a:schemeClr val="accent1"/>
+          </a:fillRef>
+          <a:effectRef idx="0">
+            <a:schemeClr val="accent1"/>
+          </a:effectRef>
+          <a:fontRef idx="minor">
+            <a:schemeClr val="tx1"/>
+          </a:fontRef>
+        </p:style>
+      </p:cxnSp>
+      <p:cxnSp>
+        <p:nvCxnSpPr>
+          <p:cNvPr id="50" name="Straight Connector 49"/>
+          <p:cNvCxnSpPr/>
+          <p:nvPr/>
+        </p:nvCxnSpPr>
+        <p:spPr>
+          <a:xfrm flipH="1">
+            <a:off x="7486675" y="1074375"/>
+            <a:ext cx="114302" cy="47554"/>
+          </a:xfrm>
+          <a:prstGeom prst="line">
+            <a:avLst/>
+          </a:prstGeom>
+          <a:ln w="12700">
+            <a:solidFill>
+              <a:schemeClr val="tx1">
+                <a:lumMod val="50000"/>
+                <a:lumOff val="50000"/>
+              </a:schemeClr>
+            </a:solidFill>
+          </a:ln>
+        </p:spPr>
+        <p:style>
+          <a:lnRef idx="1">
+            <a:schemeClr val="accent1"/>
+          </a:lnRef>
+          <a:fillRef idx="0">
+            <a:schemeClr val="accent1"/>
+          </a:fillRef>
+          <a:effectRef idx="0">
+            <a:schemeClr val="accent1"/>
+          </a:effectRef>
+          <a:fontRef idx="minor">
+            <a:schemeClr val="tx1"/>
+          </a:fontRef>
+        </p:style>
+      </p:cxnSp>
     </p:spTree>
     <p:extLst>
       <p:ext uri="{BB962C8B-B14F-4D97-AF65-F5344CB8AC3E}">

</xml_diff>